<commit_message>
change primary key to auto_increment for users table
</commit_message>
<xml_diff>
--- a/documents/Music Facts Generator.pptx
+++ b/documents/Music Facts Generator.pptx
@@ -146,10 +146,6 @@
     </p:ext>
   </p:extLst>
 </p:presentation>
-</file>
-
-<file path=ppt/revisionInfo.xml><?xml version="1.0" encoding="utf-8"?>
-<p1510:revInfo xmlns:a="http://schemas.openxmlformats.org/drawingml/2006/main" xmlns:r="http://schemas.openxmlformats.org/officeDocument/2006/relationships" xmlns:p1510="http://schemas.microsoft.com/office/powerpoint/2015/10/main"/>
 </file>
 
 <file path=ppt/handoutMasters/handoutMaster1.xml><?xml version="1.0" encoding="utf-8"?>

</xml_diff>